<commit_message>
lab meeting presentation update.
</commit_message>
<xml_diff>
--- a/Presentation.pptx
+++ b/Presentation.pptx
@@ -12,11 +12,11 @@
     <p:sldId id="259" r:id="rId3"/>
     <p:sldId id="258" r:id="rId4"/>
     <p:sldId id="261" r:id="rId5"/>
-    <p:sldId id="280" r:id="rId6"/>
-    <p:sldId id="283" r:id="rId7"/>
-    <p:sldId id="286" r:id="rId8"/>
-    <p:sldId id="287" r:id="rId9"/>
-    <p:sldId id="284" r:id="rId10"/>
+    <p:sldId id="289" r:id="rId6"/>
+    <p:sldId id="280" r:id="rId7"/>
+    <p:sldId id="287" r:id="rId8"/>
+    <p:sldId id="284" r:id="rId9"/>
+    <p:sldId id="290" r:id="rId10"/>
     <p:sldId id="288" r:id="rId11"/>
     <p:sldId id="282" r:id="rId12"/>
     <p:sldId id="285" r:id="rId13"/>
@@ -3954,7 +3954,10 @@
           <a:lstStyle/>
           <a:p>
             <a:pPr algn="ctr"/>
-            <a:endParaRPr lang="en-US" sz="3000" dirty="0"/>
+            <a:r>
+              <a:rPr lang="en-US" sz="3000" dirty="0"/>
+              <a:t>Variable contributions in principal component 1</a:t>
+            </a:r>
           </a:p>
         </p:txBody>
       </p:sp>
@@ -4247,7 +4250,7 @@
         <p:spPr>
           <a:xfrm>
             <a:off x="839788" y="3347944"/>
-            <a:ext cx="5157787" cy="1365764"/>
+            <a:ext cx="5157786" cy="1365764"/>
           </a:xfrm>
         </p:spPr>
       </p:pic>
@@ -4314,7 +4317,7 @@
         <p:spPr>
           <a:xfrm>
             <a:off x="6194429" y="3347944"/>
-            <a:ext cx="5183184" cy="1241940"/>
+            <a:ext cx="5183184" cy="1241939"/>
           </a:xfrm>
         </p:spPr>
       </p:pic>
@@ -4678,7 +4681,7 @@
             <p:ph sz="half" idx="2"/>
             <p:extLst>
               <p:ext uri="{D42A27DB-BD31-4B8C-83A1-F6EECF244321}">
-                <p14:modId xmlns:p14="http://schemas.microsoft.com/office/powerpoint/2010/main" val="4067429533"/>
+                <p14:modId xmlns:p14="http://schemas.microsoft.com/office/powerpoint/2010/main" val="1664059278"/>
               </p:ext>
             </p:extLst>
           </p:nvPr>
@@ -4801,7 +4804,7 @@
                       <a:pPr algn="ctr"/>
                       <a:r>
                         <a:rPr lang="en-US" dirty="0"/>
-                        <a:t>0.06</a:t>
+                        <a:t>0.08</a:t>
                       </a:r>
                     </a:p>
                   </a:txBody>
@@ -4849,7 +4852,7 @@
                       <a:pPr algn="ctr"/>
                       <a:r>
                         <a:rPr lang="en-US" dirty="0"/>
-                        <a:t>0.18</a:t>
+                        <a:t>0.19</a:t>
                       </a:r>
                     </a:p>
                   </a:txBody>
@@ -4883,7 +4886,7 @@
                       <a:pPr algn="ctr"/>
                       <a:r>
                         <a:rPr lang="en-US" dirty="0"/>
-                        <a:t>0.36</a:t>
+                        <a:t>0.38</a:t>
                       </a:r>
                     </a:p>
                   </a:txBody>
@@ -4897,7 +4900,7 @@
                       <a:pPr algn="ctr"/>
                       <a:r>
                         <a:rPr lang="en-US" dirty="0"/>
-                        <a:t>0.25</a:t>
+                        <a:t>0.24</a:t>
                       </a:r>
                     </a:p>
                   </a:txBody>
@@ -4979,7 +4982,7 @@
                       <a:pPr algn="ctr"/>
                       <a:r>
                         <a:rPr lang="en-US" dirty="0"/>
-                        <a:t>0.32</a:t>
+                        <a:t>0.34</a:t>
                       </a:r>
                     </a:p>
                   </a:txBody>
@@ -4993,7 +4996,7 @@
                       <a:pPr algn="ctr"/>
                       <a:r>
                         <a:rPr lang="en-US" dirty="0"/>
-                        <a:t>0.16</a:t>
+                        <a:t>0.17</a:t>
                       </a:r>
                     </a:p>
                   </a:txBody>
@@ -5027,7 +5030,7 @@
                       <a:pPr algn="ctr"/>
                       <a:r>
                         <a:rPr lang="en-US" dirty="0"/>
-                        <a:t>0.20</a:t>
+                        <a:t>0.18</a:t>
                       </a:r>
                     </a:p>
                   </a:txBody>
@@ -5041,7 +5044,7 @@
                       <a:pPr algn="ctr"/>
                       <a:r>
                         <a:rPr lang="en-US" dirty="0"/>
-                        <a:t>0.07</a:t>
+                        <a:t>0.09</a:t>
                       </a:r>
                     </a:p>
                   </a:txBody>
@@ -5075,7 +5078,7 @@
                       <a:pPr algn="ctr"/>
                       <a:r>
                         <a:rPr lang="en-US" dirty="0"/>
-                        <a:t>0.57</a:t>
+                        <a:t>0.60</a:t>
                       </a:r>
                     </a:p>
                   </a:txBody>
@@ -5089,7 +5092,7 @@
                       <a:pPr algn="ctr"/>
                       <a:r>
                         <a:rPr lang="en-US" dirty="0"/>
-                        <a:t>0.41</a:t>
+                        <a:t>0.40</a:t>
                       </a:r>
                     </a:p>
                   </a:txBody>
@@ -5149,7 +5152,7 @@
             <p:ph sz="quarter" idx="4"/>
             <p:extLst>
               <p:ext uri="{D42A27DB-BD31-4B8C-83A1-F6EECF244321}">
-                <p14:modId xmlns:p14="http://schemas.microsoft.com/office/powerpoint/2010/main" val="580300133"/>
+                <p14:modId xmlns:p14="http://schemas.microsoft.com/office/powerpoint/2010/main" val="38576167"/>
               </p:ext>
             </p:extLst>
           </p:nvPr>
@@ -5258,21 +5261,21 @@
                       <a:pPr algn="ctr"/>
                       <a:r>
                         <a:rPr lang="en-US" dirty="0"/>
+                        <a:t>0.19</a:t>
+                      </a:r>
+                    </a:p>
+                  </a:txBody>
+                  <a:tcPr/>
+                </a:tc>
+                <a:tc>
+                  <a:txBody>
+                    <a:bodyPr/>
+                    <a:lstStyle/>
+                    <a:p>
+                      <a:pPr algn="ctr"/>
+                      <a:r>
+                        <a:rPr lang="en-US" dirty="0"/>
                         <a:t>0.08</a:t>
-                      </a:r>
-                    </a:p>
-                  </a:txBody>
-                  <a:tcPr/>
-                </a:tc>
-                <a:tc>
-                  <a:txBody>
-                    <a:bodyPr/>
-                    <a:lstStyle/>
-                    <a:p>
-                      <a:pPr algn="ctr"/>
-                      <a:r>
-                        <a:rPr lang="en-US" dirty="0"/>
-                        <a:t>0.18</a:t>
                       </a:r>
                     </a:p>
                   </a:txBody>
@@ -5306,21 +5309,21 @@
                       <a:pPr algn="ctr"/>
                       <a:r>
                         <a:rPr lang="en-US" dirty="0"/>
+                        <a:t>0.27</a:t>
+                      </a:r>
+                    </a:p>
+                  </a:txBody>
+                  <a:tcPr/>
+                </a:tc>
+                <a:tc>
+                  <a:txBody>
+                    <a:bodyPr/>
+                    <a:lstStyle/>
+                    <a:p>
+                      <a:pPr algn="ctr"/>
+                      <a:r>
+                        <a:rPr lang="en-US" dirty="0"/>
                         <a:t>0.18</a:t>
-                      </a:r>
-                    </a:p>
-                  </a:txBody>
-                  <a:tcPr/>
-                </a:tc>
-                <a:tc>
-                  <a:txBody>
-                    <a:bodyPr/>
-                    <a:lstStyle/>
-                    <a:p>
-                      <a:pPr algn="ctr"/>
-                      <a:r>
-                        <a:rPr lang="en-US" dirty="0"/>
-                        <a:t>0.28</a:t>
                       </a:r>
                     </a:p>
                   </a:txBody>
@@ -5354,21 +5357,21 @@
                       <a:pPr algn="ctr"/>
                       <a:r>
                         <a:rPr lang="en-US" dirty="0"/>
+                        <a:t>0.34</a:t>
+                      </a:r>
+                    </a:p>
+                  </a:txBody>
+                  <a:tcPr/>
+                </a:tc>
+                <a:tc>
+                  <a:txBody>
+                    <a:bodyPr/>
+                    <a:lstStyle/>
+                    <a:p>
+                      <a:pPr algn="ctr"/>
+                      <a:r>
+                        <a:rPr lang="en-US" dirty="0"/>
                         <a:t>0.24</a:t>
-                      </a:r>
-                    </a:p>
-                  </a:txBody>
-                  <a:tcPr/>
-                </a:tc>
-                <a:tc>
-                  <a:txBody>
-                    <a:bodyPr/>
-                    <a:lstStyle/>
-                    <a:p>
-                      <a:pPr algn="ctr"/>
-                      <a:r>
-                        <a:rPr lang="en-US" dirty="0"/>
-                        <a:t>0.34</a:t>
                       </a:r>
                     </a:p>
                   </a:txBody>
@@ -5402,7 +5405,7 @@
                       <a:pPr algn="ctr"/>
                       <a:r>
                         <a:rPr lang="en-US" dirty="0"/>
-                        <a:t>0.14</a:t>
+                        <a:t>0.23</a:t>
                       </a:r>
                     </a:p>
                   </a:txBody>
@@ -5416,7 +5419,7 @@
                       <a:pPr algn="ctr"/>
                       <a:r>
                         <a:rPr lang="en-US" dirty="0"/>
-                        <a:t>0.23</a:t>
+                        <a:t>0.13</a:t>
                       </a:r>
                     </a:p>
                   </a:txBody>
@@ -5450,7 +5453,7 @@
                       <a:pPr algn="ctr"/>
                       <a:r>
                         <a:rPr lang="en-US" dirty="0"/>
-                        <a:t>0.16</a:t>
+                        <a:t>0.29</a:t>
                       </a:r>
                     </a:p>
                   </a:txBody>
@@ -5464,7 +5467,7 @@
                       <a:pPr algn="ctr"/>
                       <a:r>
                         <a:rPr lang="en-US" dirty="0"/>
-                        <a:t>0.29</a:t>
+                        <a:t>0.17</a:t>
                       </a:r>
                     </a:p>
                   </a:txBody>
@@ -5498,21 +5501,21 @@
                       <a:pPr algn="ctr"/>
                       <a:r>
                         <a:rPr lang="en-US" dirty="0"/>
+                        <a:t>0.16</a:t>
+                      </a:r>
+                    </a:p>
+                  </a:txBody>
+                  <a:tcPr/>
+                </a:tc>
+                <a:tc>
+                  <a:txBody>
+                    <a:bodyPr/>
+                    <a:lstStyle/>
+                    <a:p>
+                      <a:pPr algn="ctr"/>
+                      <a:r>
+                        <a:rPr lang="en-US" dirty="0"/>
                         <a:t>0.09</a:t>
-                      </a:r>
-                    </a:p>
-                  </a:txBody>
-                  <a:tcPr/>
-                </a:tc>
-                <a:tc>
-                  <a:txBody>
-                    <a:bodyPr/>
-                    <a:lstStyle/>
-                    <a:p>
-                      <a:pPr algn="ctr"/>
-                      <a:r>
-                        <a:rPr lang="en-US" dirty="0"/>
-                        <a:t>0.15</a:t>
                       </a:r>
                     </a:p>
                   </a:txBody>
@@ -5546,7 +5549,7 @@
                       <a:pPr algn="ctr"/>
                       <a:r>
                         <a:rPr lang="en-US" dirty="0"/>
-                        <a:t>0.39</a:t>
+                        <a:t>0.55</a:t>
                       </a:r>
                     </a:p>
                   </a:txBody>
@@ -5560,7 +5563,7 @@
                       <a:pPr algn="ctr"/>
                       <a:r>
                         <a:rPr lang="en-US" dirty="0"/>
-                        <a:t>0.55</a:t>
+                        <a:t>0.40</a:t>
                       </a:r>
                     </a:p>
                   </a:txBody>
@@ -5709,7 +5712,7 @@
           <a:p>
             <a:r>
               <a:rPr lang="en-US" sz="2400" dirty="0"/>
-              <a:t>Trauma injury can lead to life-threatening complications throughout a hospital course</a:t>
+              <a:t>Trauma injury can lead to life-threatening complications throughout hospitalization</a:t>
             </a:r>
           </a:p>
         </p:txBody>
@@ -5864,19 +5867,19 @@
           <a:p>
             <a:r>
               <a:rPr lang="en-US" dirty="0"/>
-              <a:t>Data Cleaning</a:t>
+              <a:t>Data cleaning</a:t>
             </a:r>
           </a:p>
           <a:p>
             <a:r>
               <a:rPr lang="en-US" dirty="0"/>
-              <a:t>Clustering and Heatmaps</a:t>
+              <a:t>Clustering and heatmaps</a:t>
             </a:r>
           </a:p>
           <a:p>
             <a:r>
               <a:rPr lang="en-US" dirty="0"/>
-              <a:t>PCA Plots</a:t>
+              <a:t>PCA plots</a:t>
             </a:r>
           </a:p>
           <a:p>
@@ -5967,12 +5970,9 @@
           <a:lstStyle/>
           <a:p>
             <a:r>
-              <a:rPr lang="en-US" dirty="0"/>
-              <a:t>PROPPR Dataset – Original study was a blood transfusion study</a:t>
-            </a:r>
-          </a:p>
-          <a:p>
-            <a:endParaRPr lang="en-US" dirty="0"/>
+              <a:rPr lang="en-US" sz="2000" dirty="0"/>
+              <a:t>Dataset from PROPPR (Pragmatic, Randomized, Optimal Platelet and Plasma Ratios) Trial at timepoint 0.</a:t>
+            </a:r>
           </a:p>
           <a:p>
             <a:endParaRPr lang="en-US" dirty="0"/>
@@ -6000,44 +6000,51 @@
           <p:nvPr>
             <p:extLst>
               <p:ext uri="{D42A27DB-BD31-4B8C-83A1-F6EECF244321}">
-                <p14:modId xmlns:p14="http://schemas.microsoft.com/office/powerpoint/2010/main" val="3598996966"/>
+                <p14:modId xmlns:p14="http://schemas.microsoft.com/office/powerpoint/2010/main" val="1655457033"/>
               </p:ext>
             </p:extLst>
           </p:nvPr>
         </p:nvGraphicFramePr>
         <p:xfrm>
           <a:off x="2032000" y="2472965"/>
-          <a:ext cx="8128000" cy="1483360"/>
+          <a:ext cx="8128000" cy="1752600"/>
         </p:xfrm>
         <a:graphic>
           <a:graphicData uri="http://schemas.openxmlformats.org/drawingml/2006/table">
             <a:tbl>
-              <a:tblPr firstRow="1" firstCol="1" bandRow="1">
+              <a:tblPr firstRow="1" firstCol="1">
                 <a:tableStyleId>{5C22544A-7EE6-4342-B048-85BDC9FD1C3A}</a:tableStyleId>
               </a:tblPr>
               <a:tblGrid>
-                <a:gridCol w="2032000">
+                <a:gridCol w="1625600">
                   <a:extLst>
                     <a:ext uri="{9D8B030D-6E8A-4147-A177-3AD203B41FA5}">
                       <a16:colId xmlns:a16="http://schemas.microsoft.com/office/drawing/2014/main" val="223809974"/>
                     </a:ext>
                   </a:extLst>
                 </a:gridCol>
-                <a:gridCol w="2032000">
+                <a:gridCol w="1625600">
                   <a:extLst>
                     <a:ext uri="{9D8B030D-6E8A-4147-A177-3AD203B41FA5}">
                       <a16:colId xmlns:a16="http://schemas.microsoft.com/office/drawing/2014/main" val="849379723"/>
                     </a:ext>
                   </a:extLst>
                 </a:gridCol>
-                <a:gridCol w="2032000">
+                <a:gridCol w="1625600">
                   <a:extLst>
                     <a:ext uri="{9D8B030D-6E8A-4147-A177-3AD203B41FA5}">
                       <a16:colId xmlns:a16="http://schemas.microsoft.com/office/drawing/2014/main" val="2122961680"/>
                     </a:ext>
                   </a:extLst>
                 </a:gridCol>
-                <a:gridCol w="2032000">
+                <a:gridCol w="1625600">
+                  <a:extLst>
+                    <a:ext uri="{9D8B030D-6E8A-4147-A177-3AD203B41FA5}">
+                      <a16:colId xmlns:a16="http://schemas.microsoft.com/office/drawing/2014/main" val="1754667260"/>
+                    </a:ext>
+                  </a:extLst>
+                </a:gridCol>
+                <a:gridCol w="1625600">
                   <a:extLst>
                     <a:ext uri="{9D8B030D-6E8A-4147-A177-3AD203B41FA5}">
                       <a16:colId xmlns:a16="http://schemas.microsoft.com/office/drawing/2014/main" val="3565519859"/>
@@ -6092,6 +6099,20 @@
                       <a:pPr algn="ctr"/>
                       <a:r>
                         <a:rPr lang="en-US" dirty="0"/>
+                        <a:t>Both Types of Injury</a:t>
+                      </a:r>
+                    </a:p>
+                  </a:txBody>
+                  <a:tcPr/>
+                </a:tc>
+                <a:tc>
+                  <a:txBody>
+                    <a:bodyPr/>
+                    <a:lstStyle/>
+                    <a:p>
+                      <a:pPr algn="ctr"/>
+                      <a:r>
+                        <a:rPr lang="en-US" dirty="0"/>
                         <a:t>Total</a:t>
                       </a:r>
                     </a:p>
@@ -6155,7 +6176,21 @@
                       <a:pPr algn="ctr"/>
                       <a:r>
                         <a:rPr lang="en-US" dirty="0"/>
-                        <a:t>474</a:t>
+                        <a:t>4</a:t>
+                      </a:r>
+                    </a:p>
+                  </a:txBody>
+                  <a:tcPr/>
+                </a:tc>
+                <a:tc>
+                  <a:txBody>
+                    <a:bodyPr/>
+                    <a:lstStyle/>
+                    <a:p>
+                      <a:pPr algn="ctr"/>
+                      <a:r>
+                        <a:rPr lang="en-US" dirty="0"/>
+                        <a:t>478</a:t>
                       </a:r>
                     </a:p>
                   </a:txBody>
@@ -6218,7 +6253,21 @@
                       <a:pPr algn="ctr"/>
                       <a:r>
                         <a:rPr lang="en-US" dirty="0"/>
-                        <a:t>113</a:t>
+                        <a:t>3</a:t>
+                      </a:r>
+                    </a:p>
+                  </a:txBody>
+                  <a:tcPr/>
+                </a:tc>
+                <a:tc>
+                  <a:txBody>
+                    <a:bodyPr/>
+                    <a:lstStyle/>
+                    <a:p>
+                      <a:pPr algn="ctr"/>
+                      <a:r>
+                        <a:rPr lang="en-US" dirty="0"/>
+                        <a:t>116</a:t>
                       </a:r>
                     </a:p>
                   </a:txBody>
@@ -6281,7 +6330,21 @@
                       <a:pPr algn="ctr"/>
                       <a:r>
                         <a:rPr lang="en-US" dirty="0"/>
-                        <a:t>587</a:t>
+                        <a:t>7</a:t>
+                      </a:r>
+                    </a:p>
+                  </a:txBody>
+                  <a:tcPr/>
+                </a:tc>
+                <a:tc>
+                  <a:txBody>
+                    <a:bodyPr/>
+                    <a:lstStyle/>
+                    <a:p>
+                      <a:pPr algn="ctr"/>
+                      <a:r>
+                        <a:rPr lang="en-US" dirty="0"/>
+                        <a:t>594</a:t>
                       </a:r>
                     </a:p>
                   </a:txBody>
@@ -6290,6 +6353,192 @@
                 <a:extLst>
                   <a:ext uri="{0D108BD9-81ED-4DB2-BD59-A6C34878D82A}">
                     <a16:rowId xmlns:a16="http://schemas.microsoft.com/office/drawing/2014/main" val="3136741411"/>
+                  </a:ext>
+                </a:extLst>
+              </a:tr>
+            </a:tbl>
+          </a:graphicData>
+        </a:graphic>
+      </p:graphicFrame>
+      <p:graphicFrame>
+        <p:nvGraphicFramePr>
+          <p:cNvPr id="5" name="Table 5">
+            <a:extLst>
+              <a:ext uri="{FF2B5EF4-FFF2-40B4-BE49-F238E27FC236}">
+                <a16:creationId xmlns:a16="http://schemas.microsoft.com/office/drawing/2014/main" id="{2B1D59D2-83BE-4ECC-9677-91044DFC8D1C}"/>
+              </a:ext>
+            </a:extLst>
+          </p:cNvPr>
+          <p:cNvGraphicFramePr>
+            <a:graphicFrameLocks noGrp="1"/>
+          </p:cNvGraphicFramePr>
+          <p:nvPr>
+            <p:extLst>
+              <p:ext uri="{D42A27DB-BD31-4B8C-83A1-F6EECF244321}">
+                <p14:modId xmlns:p14="http://schemas.microsoft.com/office/powerpoint/2010/main" val="2544530360"/>
+              </p:ext>
+            </p:extLst>
+          </p:nvPr>
+        </p:nvGraphicFramePr>
+        <p:xfrm>
+          <a:off x="2032000" y="4504605"/>
+          <a:ext cx="8128000" cy="1010920"/>
+        </p:xfrm>
+        <a:graphic>
+          <a:graphicData uri="http://schemas.openxmlformats.org/drawingml/2006/table">
+            <a:tbl>
+              <a:tblPr firstRow="1" firstCol="1">
+                <a:tableStyleId>{5C22544A-7EE6-4342-B048-85BDC9FD1C3A}</a:tableStyleId>
+              </a:tblPr>
+              <a:tblGrid>
+                <a:gridCol w="2032000">
+                  <a:extLst>
+                    <a:ext uri="{9D8B030D-6E8A-4147-A177-3AD203B41FA5}">
+                      <a16:colId xmlns:a16="http://schemas.microsoft.com/office/drawing/2014/main" val="3129092491"/>
+                    </a:ext>
+                  </a:extLst>
+                </a:gridCol>
+                <a:gridCol w="2032000">
+                  <a:extLst>
+                    <a:ext uri="{9D8B030D-6E8A-4147-A177-3AD203B41FA5}">
+                      <a16:colId xmlns:a16="http://schemas.microsoft.com/office/drawing/2014/main" val="3639766220"/>
+                    </a:ext>
+                  </a:extLst>
+                </a:gridCol>
+                <a:gridCol w="2032000">
+                  <a:extLst>
+                    <a:ext uri="{9D8B030D-6E8A-4147-A177-3AD203B41FA5}">
+                      <a16:colId xmlns:a16="http://schemas.microsoft.com/office/drawing/2014/main" val="930657433"/>
+                    </a:ext>
+                  </a:extLst>
+                </a:gridCol>
+                <a:gridCol w="2032000">
+                  <a:extLst>
+                    <a:ext uri="{9D8B030D-6E8A-4147-A177-3AD203B41FA5}">
+                      <a16:colId xmlns:a16="http://schemas.microsoft.com/office/drawing/2014/main" val="3843598146"/>
+                    </a:ext>
+                  </a:extLst>
+                </a:gridCol>
+              </a:tblGrid>
+              <a:tr h="0">
+                <a:tc>
+                  <a:txBody>
+                    <a:bodyPr/>
+                    <a:lstStyle/>
+                    <a:p>
+                      <a:endParaRPr lang="en-US" dirty="0"/>
+                    </a:p>
+                  </a:txBody>
+                  <a:tcPr/>
+                </a:tc>
+                <a:tc>
+                  <a:txBody>
+                    <a:bodyPr/>
+                    <a:lstStyle/>
+                    <a:p>
+                      <a:pPr algn="ctr"/>
+                      <a:r>
+                        <a:rPr lang="en-US" dirty="0"/>
+                        <a:t>Blunt Injury</a:t>
+                      </a:r>
+                    </a:p>
+                  </a:txBody>
+                  <a:tcPr/>
+                </a:tc>
+                <a:tc>
+                  <a:txBody>
+                    <a:bodyPr/>
+                    <a:lstStyle/>
+                    <a:p>
+                      <a:pPr algn="ctr"/>
+                      <a:r>
+                        <a:rPr lang="en-US" dirty="0"/>
+                        <a:t>Penetrating Injury</a:t>
+                      </a:r>
+                    </a:p>
+                  </a:txBody>
+                  <a:tcPr/>
+                </a:tc>
+                <a:tc>
+                  <a:txBody>
+                    <a:bodyPr/>
+                    <a:lstStyle/>
+                    <a:p>
+                      <a:pPr algn="ctr"/>
+                      <a:r>
+                        <a:rPr lang="en-US" dirty="0"/>
+                        <a:t>Both Types of Injury</a:t>
+                      </a:r>
+                    </a:p>
+                  </a:txBody>
+                  <a:tcPr/>
+                </a:tc>
+                <a:extLst>
+                  <a:ext uri="{0D108BD9-81ED-4DB2-BD59-A6C34878D82A}">
+                    <a16:rowId xmlns:a16="http://schemas.microsoft.com/office/drawing/2014/main" val="525592647"/>
+                  </a:ext>
+                </a:extLst>
+              </a:tr>
+              <a:tr h="370840">
+                <a:tc>
+                  <a:txBody>
+                    <a:bodyPr/>
+                    <a:lstStyle/>
+                    <a:p>
+                      <a:pPr algn="r"/>
+                      <a:r>
+                        <a:rPr lang="en-US" dirty="0"/>
+                        <a:t>Age</a:t>
+                      </a:r>
+                    </a:p>
+                  </a:txBody>
+                  <a:tcPr/>
+                </a:tc>
+                <a:tc>
+                  <a:txBody>
+                    <a:bodyPr/>
+                    <a:lstStyle/>
+                    <a:p>
+                      <a:pPr algn="ctr"/>
+                      <a:r>
+                        <a:rPr lang="en-US" dirty="0"/>
+                        <a:t>42.7 ± 18.9</a:t>
+                      </a:r>
+                    </a:p>
+                  </a:txBody>
+                  <a:tcPr/>
+                </a:tc>
+                <a:tc>
+                  <a:txBody>
+                    <a:bodyPr/>
+                    <a:lstStyle/>
+                    <a:p>
+                      <a:pPr algn="ctr"/>
+                      <a:r>
+                        <a:rPr lang="en-US" dirty="0"/>
+                        <a:t>34.3 ± 15.5 </a:t>
+                      </a:r>
+                    </a:p>
+                  </a:txBody>
+                  <a:tcPr/>
+                </a:tc>
+                <a:tc>
+                  <a:txBody>
+                    <a:bodyPr/>
+                    <a:lstStyle/>
+                    <a:p>
+                      <a:pPr algn="ctr"/>
+                      <a:r>
+                        <a:rPr lang="en-US" dirty="0"/>
+                        <a:t>42.7 ± 18.9</a:t>
+                      </a:r>
+                    </a:p>
+                  </a:txBody>
+                  <a:tcPr/>
+                </a:tc>
+                <a:extLst>
+                  <a:ext uri="{0D108BD9-81ED-4DB2-BD59-A6C34878D82A}">
+                    <a16:rowId xmlns:a16="http://schemas.microsoft.com/office/drawing/2014/main" val="3777580411"/>
                   </a:ext>
                 </a:extLst>
               </a:tr>
@@ -6332,7 +6581,7 @@
           <p:cNvPr id="2" name="Title 1">
             <a:extLst>
               <a:ext uri="{FF2B5EF4-FFF2-40B4-BE49-F238E27FC236}">
-                <a16:creationId xmlns:a16="http://schemas.microsoft.com/office/drawing/2014/main" id="{ED61250D-D448-446B-BE16-99038F13F97B}"/>
+                <a16:creationId xmlns:a16="http://schemas.microsoft.com/office/drawing/2014/main" id="{0BE09E1D-76B6-451E-A707-276EA5BDB623}"/>
               </a:ext>
             </a:extLst>
           </p:cNvPr>
@@ -6350,7 +6599,7 @@
           <a:p>
             <a:r>
               <a:rPr lang="en-US" dirty="0"/>
-              <a:t>Data Cleaning</a:t>
+              <a:t>R Libraries</a:t>
             </a:r>
           </a:p>
         </p:txBody>
@@ -6360,7 +6609,7 @@
           <p:cNvPr id="3" name="Content Placeholder 2">
             <a:extLst>
               <a:ext uri="{FF2B5EF4-FFF2-40B4-BE49-F238E27FC236}">
-                <a16:creationId xmlns:a16="http://schemas.microsoft.com/office/drawing/2014/main" id="{753CE5E3-99BE-4204-ADB0-D8A31383103F}"/>
+                <a16:creationId xmlns:a16="http://schemas.microsoft.com/office/drawing/2014/main" id="{C7903331-9119-4F3B-B1BC-C8DF4A5C30FE}"/>
               </a:ext>
             </a:extLst>
           </p:cNvPr>
@@ -6377,28 +6626,85 @@
           <a:lstStyle/>
           <a:p>
             <a:r>
-              <a:rPr lang="en-US" sz="2400" dirty="0"/>
-              <a:t>Removed biomarker columns that are missing more than 20% of their values</a:t>
-            </a:r>
-          </a:p>
-          <a:p>
-            <a:r>
-              <a:rPr lang="en-US" sz="2400" dirty="0"/>
-              <a:t>Removed any subjects with missing more than 10% of biomarker measurements</a:t>
-            </a:r>
-          </a:p>
-          <a:p>
-            <a:r>
-              <a:rPr lang="en-US" sz="2400" dirty="0"/>
-              <a:t>Imputed any missing values for k-means</a:t>
-            </a:r>
+              <a:rPr lang="en-US" dirty="0"/>
+              <a:t>Data manipulation:</a:t>
+            </a:r>
+          </a:p>
+          <a:p>
+            <a:pPr lvl="1"/>
+            <a:r>
+              <a:rPr lang="en-US" dirty="0" err="1"/>
+              <a:t>Tidyverse</a:t>
+            </a:r>
+            <a:endParaRPr lang="en-US" dirty="0"/>
+          </a:p>
+          <a:p>
+            <a:pPr lvl="1"/>
+            <a:r>
+              <a:rPr lang="en-US" dirty="0" err="1"/>
+              <a:t>Hmisc</a:t>
+            </a:r>
+            <a:endParaRPr lang="en-US" dirty="0"/>
+          </a:p>
+          <a:p>
+            <a:pPr lvl="1"/>
+            <a:r>
+              <a:rPr lang="en-US" dirty="0" err="1"/>
+              <a:t>data.table</a:t>
+            </a:r>
+            <a:endParaRPr lang="en-US" dirty="0"/>
+          </a:p>
+          <a:p>
+            <a:r>
+              <a:rPr lang="en-US" dirty="0"/>
+              <a:t>Visualization &amp; Clustering</a:t>
+            </a:r>
+          </a:p>
+          <a:p>
+            <a:pPr lvl="1"/>
+            <a:r>
+              <a:rPr lang="en-US" dirty="0" err="1"/>
+              <a:t>Pheatmap</a:t>
+            </a:r>
+            <a:endParaRPr lang="en-US" dirty="0"/>
+          </a:p>
+          <a:p>
+            <a:pPr lvl="1"/>
+            <a:r>
+              <a:rPr lang="en-US" dirty="0" err="1"/>
+              <a:t>Factoextra</a:t>
+            </a:r>
+            <a:endParaRPr lang="en-US" dirty="0"/>
+          </a:p>
+          <a:p>
+            <a:pPr lvl="1"/>
+            <a:r>
+              <a:rPr lang="en-US" dirty="0"/>
+              <a:t>ggplot2</a:t>
+            </a:r>
+          </a:p>
+          <a:p>
+            <a:pPr lvl="1"/>
+            <a:r>
+              <a:rPr lang="en-US" dirty="0" err="1"/>
+              <a:t>Viridis</a:t>
+            </a:r>
+            <a:endParaRPr lang="en-US" dirty="0"/>
+          </a:p>
+          <a:p>
+            <a:pPr lvl="1"/>
+            <a:r>
+              <a:rPr lang="en-US" dirty="0" err="1"/>
+              <a:t>Rgl</a:t>
+            </a:r>
+            <a:endParaRPr lang="en-US" dirty="0"/>
           </a:p>
         </p:txBody>
       </p:sp>
     </p:spTree>
     <p:extLst>
       <p:ext uri="{BB962C8B-B14F-4D97-AF65-F5344CB8AC3E}">
-        <p14:creationId xmlns:p14="http://schemas.microsoft.com/office/powerpoint/2010/main" val="2127122932"/>
+        <p14:creationId xmlns:p14="http://schemas.microsoft.com/office/powerpoint/2010/main" val="1396010543"/>
       </p:ext>
     </p:extLst>
   </p:cSld>
@@ -6430,7 +6736,7 @@
           <p:cNvPr id="2" name="Title 1">
             <a:extLst>
               <a:ext uri="{FF2B5EF4-FFF2-40B4-BE49-F238E27FC236}">
-                <a16:creationId xmlns:a16="http://schemas.microsoft.com/office/drawing/2014/main" id="{FAB55B64-96F0-46AF-9163-9CB79C7F94A1}"/>
+                <a16:creationId xmlns:a16="http://schemas.microsoft.com/office/drawing/2014/main" id="{ED61250D-D448-446B-BE16-99038F13F97B}"/>
               </a:ext>
             </a:extLst>
           </p:cNvPr>
@@ -6443,153 +6749,79 @@
         </p:nvSpPr>
         <p:spPr/>
         <p:txBody>
-          <a:bodyPr>
-            <a:normAutofit/>
-          </a:bodyPr>
-          <a:lstStyle/>
-          <a:p>
-            <a:pPr algn="ctr"/>
-            <a:r>
-              <a:rPr lang="en-US" sz="3000" dirty="0"/>
-              <a:t>Four outliers greatly impact hierarchical clustering</a:t>
-            </a:r>
-          </a:p>
-        </p:txBody>
-      </p:sp>
-      <p:sp>
-        <p:nvSpPr>
-          <p:cNvPr id="3" name="Text Placeholder 2">
-            <a:extLst>
-              <a:ext uri="{FF2B5EF4-FFF2-40B4-BE49-F238E27FC236}">
-                <a16:creationId xmlns:a16="http://schemas.microsoft.com/office/drawing/2014/main" id="{729F7756-2838-486E-9A9D-F995BE2C9AA0}"/>
-              </a:ext>
-            </a:extLst>
-          </p:cNvPr>
-          <p:cNvSpPr>
-            <a:spLocks noGrp="1"/>
-          </p:cNvSpPr>
-          <p:nvPr>
-            <p:ph type="body" idx="1"/>
+          <a:bodyPr/>
+          <a:lstStyle/>
+          <a:p>
+            <a:r>
+              <a:rPr lang="en-US" dirty="0"/>
+              <a:t>Data Cleaning</a:t>
+            </a:r>
+          </a:p>
+        </p:txBody>
+      </p:sp>
+      <p:sp>
+        <p:nvSpPr>
+          <p:cNvPr id="3" name="Content Placeholder 2">
+            <a:extLst>
+              <a:ext uri="{FF2B5EF4-FFF2-40B4-BE49-F238E27FC236}">
+                <a16:creationId xmlns:a16="http://schemas.microsoft.com/office/drawing/2014/main" id="{753CE5E3-99BE-4204-ADB0-D8A31383103F}"/>
+              </a:ext>
+            </a:extLst>
+          </p:cNvPr>
+          <p:cNvSpPr>
+            <a:spLocks noGrp="1"/>
+          </p:cNvSpPr>
+          <p:nvPr>
+            <p:ph idx="1"/>
           </p:nvPr>
         </p:nvSpPr>
         <p:spPr/>
         <p:txBody>
-          <a:bodyPr>
-            <a:normAutofit/>
-          </a:bodyPr>
-          <a:lstStyle/>
-          <a:p>
-            <a:r>
-              <a:rPr lang="en-US" sz="1800" dirty="0"/>
-              <a:t>With 4 ‘outliers’</a:t>
-            </a:r>
-          </a:p>
-        </p:txBody>
-      </p:sp>
-      <p:pic>
-        <p:nvPicPr>
-          <p:cNvPr id="8" name="Content Placeholder 7" descr="A picture containing background pattern&#10;&#10;Description automatically generated">
-            <a:extLst>
-              <a:ext uri="{FF2B5EF4-FFF2-40B4-BE49-F238E27FC236}">
-                <a16:creationId xmlns:a16="http://schemas.microsoft.com/office/drawing/2014/main" id="{B53D8E1E-F165-455A-9BB2-764FE3150373}"/>
-              </a:ext>
-            </a:extLst>
-          </p:cNvPr>
-          <p:cNvPicPr>
-            <a:picLocks noGrp="1" noChangeAspect="1"/>
-          </p:cNvPicPr>
-          <p:nvPr>
-            <p:ph sz="half" idx="2"/>
-          </p:nvPr>
-        </p:nvPicPr>
-        <p:blipFill>
-          <a:blip r:embed="rId2">
-            <a:extLst>
-              <a:ext uri="{28A0092B-C50C-407E-A947-70E740481C1C}">
-                <a14:useLocalDpi xmlns:a14="http://schemas.microsoft.com/office/drawing/2010/main" val="0"/>
-              </a:ext>
-            </a:extLst>
-          </a:blip>
-          <a:stretch>
-            <a:fillRect/>
-          </a:stretch>
-        </p:blipFill>
-        <p:spPr>
-          <a:xfrm>
-            <a:off x="241802" y="3006726"/>
-            <a:ext cx="5755773" cy="2428936"/>
-          </a:xfrm>
-        </p:spPr>
-      </p:pic>
-      <p:sp>
-        <p:nvSpPr>
-          <p:cNvPr id="5" name="Text Placeholder 4">
-            <a:extLst>
-              <a:ext uri="{FF2B5EF4-FFF2-40B4-BE49-F238E27FC236}">
-                <a16:creationId xmlns:a16="http://schemas.microsoft.com/office/drawing/2014/main" id="{D00D44B2-59ED-4058-8186-553F0F1F214B}"/>
-              </a:ext>
-            </a:extLst>
-          </p:cNvPr>
-          <p:cNvSpPr>
-            <a:spLocks noGrp="1"/>
-          </p:cNvSpPr>
-          <p:nvPr>
-            <p:ph type="body" sz="quarter" idx="3"/>
-          </p:nvPr>
-        </p:nvSpPr>
-        <p:spPr/>
-        <p:txBody>
-          <a:bodyPr>
-            <a:normAutofit/>
-          </a:bodyPr>
-          <a:lstStyle/>
-          <a:p>
-            <a:r>
-              <a:rPr lang="en-US" sz="1800" dirty="0"/>
-              <a:t>Without ‘outliers’</a:t>
-            </a:r>
-          </a:p>
-        </p:txBody>
-      </p:sp>
-      <p:pic>
-        <p:nvPicPr>
-          <p:cNvPr id="10" name="Content Placeholder 9" descr="A picture containing table&#10;&#10;Description automatically generated">
-            <a:extLst>
-              <a:ext uri="{FF2B5EF4-FFF2-40B4-BE49-F238E27FC236}">
-                <a16:creationId xmlns:a16="http://schemas.microsoft.com/office/drawing/2014/main" id="{BE6C5742-8586-45AE-81F6-48F1E404778C}"/>
-              </a:ext>
-            </a:extLst>
-          </p:cNvPr>
-          <p:cNvPicPr>
-            <a:picLocks noGrp="1" noChangeAspect="1"/>
-          </p:cNvPicPr>
-          <p:nvPr>
-            <p:ph sz="quarter" idx="4"/>
-          </p:nvPr>
-        </p:nvPicPr>
-        <p:blipFill>
-          <a:blip r:embed="rId3">
-            <a:extLst>
-              <a:ext uri="{28A0092B-C50C-407E-A947-70E740481C1C}">
-                <a14:useLocalDpi xmlns:a14="http://schemas.microsoft.com/office/drawing/2010/main" val="0"/>
-              </a:ext>
-            </a:extLst>
-          </a:blip>
-          <a:stretch>
-            <a:fillRect/>
-          </a:stretch>
-        </p:blipFill>
-        <p:spPr>
-          <a:xfrm>
-            <a:off x="6096000" y="3006726"/>
-            <a:ext cx="5784119" cy="2457610"/>
-          </a:xfrm>
-        </p:spPr>
-      </p:pic>
+          <a:bodyPr/>
+          <a:lstStyle/>
+          <a:p>
+            <a:r>
+              <a:rPr lang="en-US" sz="2400" dirty="0"/>
+              <a:t>Removed biomarker columns that are missing more than 20% of their values</a:t>
+            </a:r>
+          </a:p>
+          <a:p>
+            <a:r>
+              <a:rPr lang="en-US" sz="2400" dirty="0"/>
+              <a:t>Removed any subjects missing more than 10% of biomarker measurements</a:t>
+            </a:r>
+          </a:p>
+          <a:p>
+            <a:r>
+              <a:rPr lang="en-US" sz="2400" dirty="0"/>
+              <a:t>Imputed any missing values for k-means</a:t>
+            </a:r>
+          </a:p>
+          <a:p>
+            <a:endParaRPr lang="en-US" sz="2400" dirty="0"/>
+          </a:p>
+          <a:p>
+            <a:endParaRPr lang="en-US" sz="2400" dirty="0"/>
+          </a:p>
+          <a:p>
+            <a:r>
+              <a:rPr lang="en-US" sz="2400" dirty="0"/>
+              <a:t>After cleaning:</a:t>
+            </a:r>
+          </a:p>
+          <a:p>
+            <a:pPr lvl="1"/>
+            <a:r>
+              <a:rPr lang="en-US" sz="2000" dirty="0"/>
+              <a:t>Dataset size: 476</a:t>
+            </a:r>
+          </a:p>
+        </p:txBody>
+      </p:sp>
     </p:spTree>
     <p:extLst>
       <p:ext uri="{BB962C8B-B14F-4D97-AF65-F5344CB8AC3E}">
-        <p14:creationId xmlns:p14="http://schemas.microsoft.com/office/powerpoint/2010/main" val="629274228"/>
+        <p14:creationId xmlns:p14="http://schemas.microsoft.com/office/powerpoint/2010/main" val="2127122932"/>
       </p:ext>
     </p:extLst>
   </p:cSld>
@@ -6621,7 +6853,7 @@
           <p:cNvPr id="2" name="Title 1">
             <a:extLst>
               <a:ext uri="{FF2B5EF4-FFF2-40B4-BE49-F238E27FC236}">
-                <a16:creationId xmlns:a16="http://schemas.microsoft.com/office/drawing/2014/main" id="{D047A47F-7BC9-4345-8033-A1AF749B6A66}"/>
+                <a16:creationId xmlns:a16="http://schemas.microsoft.com/office/drawing/2014/main" id="{F8070BCB-05B2-4490-8DB6-B79D92B20FEF}"/>
               </a:ext>
             </a:extLst>
           </p:cNvPr>
@@ -6634,284 +6866,149 @@
         </p:nvSpPr>
         <p:spPr/>
         <p:txBody>
+          <a:bodyPr>
+            <a:normAutofit/>
+          </a:bodyPr>
+          <a:lstStyle/>
+          <a:p>
+            <a:pPr algn="ctr"/>
+            <a:r>
+              <a:rPr lang="en-US" sz="3000" dirty="0"/>
+              <a:t>Silhouette scores shows optimal number of clusters of 2</a:t>
+            </a:r>
+          </a:p>
+        </p:txBody>
+      </p:sp>
+      <p:sp>
+        <p:nvSpPr>
+          <p:cNvPr id="3" name="Text Placeholder 2">
+            <a:extLst>
+              <a:ext uri="{FF2B5EF4-FFF2-40B4-BE49-F238E27FC236}">
+                <a16:creationId xmlns:a16="http://schemas.microsoft.com/office/drawing/2014/main" id="{F325DF6E-952D-44C9-826B-C83F271C45AA}"/>
+              </a:ext>
+            </a:extLst>
+          </p:cNvPr>
+          <p:cNvSpPr>
+            <a:spLocks noGrp="1"/>
+          </p:cNvSpPr>
+          <p:nvPr>
+            <p:ph type="body" idx="1"/>
+          </p:nvPr>
+        </p:nvSpPr>
+        <p:spPr/>
+        <p:txBody>
           <a:bodyPr/>
           <a:lstStyle/>
           <a:p>
-            <a:pPr algn="ctr"/>
-            <a:r>
-              <a:rPr kumimoji="0" lang="en-US" sz="3000" b="0" i="0" u="none" strike="noStrike" kern="1200" cap="none" spc="0" normalizeH="0" baseline="0" noProof="0" dirty="0">
-                <a:ln>
-                  <a:noFill/>
-                </a:ln>
-                <a:solidFill>
-                  <a:prstClr val="black"/>
-                </a:solidFill>
-                <a:effectLst/>
-                <a:uLnTx/>
-                <a:uFillTx/>
-                <a:latin typeface="Calibri Light" panose="020F0302020204030204"/>
-                <a:ea typeface="+mj-ea"/>
-                <a:cs typeface="+mj-cs"/>
-              </a:rPr>
-              <a:t>Four outliers have little impact on k-means clustering</a:t>
-            </a:r>
-            <a:endParaRPr lang="en-US" dirty="0"/>
-          </a:p>
-        </p:txBody>
-      </p:sp>
-      <p:graphicFrame>
-        <p:nvGraphicFramePr>
-          <p:cNvPr id="3" name="Table 4">
-            <a:extLst>
-              <a:ext uri="{FF2B5EF4-FFF2-40B4-BE49-F238E27FC236}">
-                <a16:creationId xmlns:a16="http://schemas.microsoft.com/office/drawing/2014/main" id="{951007FF-C385-4C17-A231-DCA7BFC3DD88}"/>
-              </a:ext>
-            </a:extLst>
-          </p:cNvPr>
-          <p:cNvGraphicFramePr>
-            <a:graphicFrameLocks noGrp="1"/>
-          </p:cNvGraphicFramePr>
-          <p:nvPr>
-            <p:extLst>
-              <p:ext uri="{D42A27DB-BD31-4B8C-83A1-F6EECF244321}">
-                <p14:modId xmlns:p14="http://schemas.microsoft.com/office/powerpoint/2010/main" val="158957417"/>
-              </p:ext>
-            </p:extLst>
-          </p:nvPr>
-        </p:nvGraphicFramePr>
-        <p:xfrm>
-          <a:off x="2715558" y="2482630"/>
-          <a:ext cx="6096000" cy="2021840"/>
-        </p:xfrm>
-        <a:graphic>
-          <a:graphicData uri="http://schemas.openxmlformats.org/drawingml/2006/table">
-            <a:tbl>
-              <a:tblPr firstRow="1" firstCol="1" bandRow="1">
-                <a:tableStyleId>{5C22544A-7EE6-4342-B048-85BDC9FD1C3A}</a:tableStyleId>
-              </a:tblPr>
-              <a:tblGrid>
-                <a:gridCol w="2032000">
-                  <a:extLst>
-                    <a:ext uri="{9D8B030D-6E8A-4147-A177-3AD203B41FA5}">
-                      <a16:colId xmlns:a16="http://schemas.microsoft.com/office/drawing/2014/main" val="223809974"/>
-                    </a:ext>
-                  </a:extLst>
-                </a:gridCol>
-                <a:gridCol w="2032000">
-                  <a:extLst>
-                    <a:ext uri="{9D8B030D-6E8A-4147-A177-3AD203B41FA5}">
-                      <a16:colId xmlns:a16="http://schemas.microsoft.com/office/drawing/2014/main" val="849379723"/>
-                    </a:ext>
-                  </a:extLst>
-                </a:gridCol>
-                <a:gridCol w="2032000">
-                  <a:extLst>
-                    <a:ext uri="{9D8B030D-6E8A-4147-A177-3AD203B41FA5}">
-                      <a16:colId xmlns:a16="http://schemas.microsoft.com/office/drawing/2014/main" val="2122961680"/>
-                    </a:ext>
-                  </a:extLst>
-                </a:gridCol>
-              </a:tblGrid>
-              <a:tr h="370840">
-                <a:tc>
-                  <a:txBody>
-                    <a:bodyPr/>
-                    <a:lstStyle/>
-                    <a:p>
-                      <a:endParaRPr lang="en-US" dirty="0"/>
-                    </a:p>
-                  </a:txBody>
-                  <a:tcPr/>
-                </a:tc>
-                <a:tc>
-                  <a:txBody>
-                    <a:bodyPr/>
-                    <a:lstStyle/>
-                    <a:p>
-                      <a:pPr algn="ctr"/>
-                      <a:r>
-                        <a:rPr lang="en-US" dirty="0"/>
-                        <a:t>Cluster 1</a:t>
-                      </a:r>
-                    </a:p>
-                  </a:txBody>
-                  <a:tcPr/>
-                </a:tc>
-                <a:tc>
-                  <a:txBody>
-                    <a:bodyPr/>
-                    <a:lstStyle/>
-                    <a:p>
-                      <a:pPr algn="ctr"/>
-                      <a:r>
-                        <a:rPr lang="en-US" dirty="0"/>
-                        <a:t>Cluster 2</a:t>
-                      </a:r>
-                    </a:p>
-                  </a:txBody>
-                  <a:tcPr/>
-                </a:tc>
-                <a:extLst>
-                  <a:ext uri="{0D108BD9-81ED-4DB2-BD59-A6C34878D82A}">
-                    <a16:rowId xmlns:a16="http://schemas.microsoft.com/office/drawing/2014/main" val="3029916054"/>
-                  </a:ext>
-                </a:extLst>
-              </a:tr>
-              <a:tr h="370840">
-                <a:tc>
-                  <a:txBody>
-                    <a:bodyPr/>
-                    <a:lstStyle/>
-                    <a:p>
-                      <a:pPr algn="r"/>
-                      <a:r>
-                        <a:rPr lang="en-US" dirty="0"/>
-                        <a:t>K-Means No Outliers</a:t>
-                      </a:r>
-                    </a:p>
-                  </a:txBody>
-                  <a:tcPr/>
-                </a:tc>
-                <a:tc>
-                  <a:txBody>
-                    <a:bodyPr/>
-                    <a:lstStyle/>
-                    <a:p>
-                      <a:pPr algn="ctr"/>
-                      <a:r>
-                        <a:rPr lang="en-US" dirty="0"/>
-                        <a:t>207</a:t>
-                      </a:r>
-                    </a:p>
-                  </a:txBody>
-                  <a:tcPr/>
-                </a:tc>
-                <a:tc>
-                  <a:txBody>
-                    <a:bodyPr/>
-                    <a:lstStyle/>
-                    <a:p>
-                      <a:pPr algn="ctr"/>
-                      <a:r>
-                        <a:rPr lang="en-US" dirty="0"/>
-                        <a:t>260</a:t>
-                      </a:r>
-                    </a:p>
-                  </a:txBody>
-                  <a:tcPr/>
-                </a:tc>
-                <a:extLst>
-                  <a:ext uri="{0D108BD9-81ED-4DB2-BD59-A6C34878D82A}">
-                    <a16:rowId xmlns:a16="http://schemas.microsoft.com/office/drawing/2014/main" val="1088739959"/>
-                  </a:ext>
-                </a:extLst>
-              </a:tr>
-              <a:tr h="370840">
-                <a:tc>
-                  <a:txBody>
-                    <a:bodyPr/>
-                    <a:lstStyle/>
-                    <a:p>
-                      <a:pPr algn="r"/>
-                      <a:r>
-                        <a:rPr lang="en-US" dirty="0"/>
-                        <a:t>K-Means w/ Outliers</a:t>
-                      </a:r>
-                    </a:p>
-                  </a:txBody>
-                  <a:tcPr/>
-                </a:tc>
-                <a:tc>
-                  <a:txBody>
-                    <a:bodyPr/>
-                    <a:lstStyle/>
-                    <a:p>
-                      <a:pPr algn="ctr"/>
-                      <a:r>
-                        <a:rPr lang="en-US" dirty="0"/>
-                        <a:t>204</a:t>
-                      </a:r>
-                    </a:p>
-                  </a:txBody>
-                  <a:tcPr/>
-                </a:tc>
-                <a:tc>
-                  <a:txBody>
-                    <a:bodyPr/>
-                    <a:lstStyle/>
-                    <a:p>
-                      <a:pPr algn="ctr"/>
-                      <a:r>
-                        <a:rPr lang="en-US" dirty="0"/>
-                        <a:t>267</a:t>
-                      </a:r>
-                    </a:p>
-                  </a:txBody>
-                  <a:tcPr/>
-                </a:tc>
-                <a:extLst>
-                  <a:ext uri="{0D108BD9-81ED-4DB2-BD59-A6C34878D82A}">
-                    <a16:rowId xmlns:a16="http://schemas.microsoft.com/office/drawing/2014/main" val="3581973919"/>
-                  </a:ext>
-                </a:extLst>
-              </a:tr>
-              <a:tr h="370840">
-                <a:tc>
-                  <a:txBody>
-                    <a:bodyPr/>
-                    <a:lstStyle/>
-                    <a:p>
-                      <a:pPr algn="r"/>
-                      <a:r>
-                        <a:rPr lang="en-US" dirty="0"/>
-                        <a:t>Overlap</a:t>
-                      </a:r>
-                    </a:p>
-                  </a:txBody>
-                  <a:tcPr/>
-                </a:tc>
-                <a:tc>
-                  <a:txBody>
-                    <a:bodyPr/>
-                    <a:lstStyle/>
-                    <a:p>
-                      <a:pPr algn="ctr"/>
-                      <a:r>
-                        <a:rPr lang="en-US" dirty="0"/>
-                        <a:t>200</a:t>
-                      </a:r>
-                    </a:p>
-                  </a:txBody>
-                  <a:tcPr/>
-                </a:tc>
-                <a:tc>
-                  <a:txBody>
-                    <a:bodyPr/>
-                    <a:lstStyle/>
-                    <a:p>
-                      <a:pPr algn="ctr"/>
-                      <a:r>
-                        <a:rPr lang="en-US" dirty="0"/>
-                        <a:t>260</a:t>
-                      </a:r>
-                    </a:p>
-                  </a:txBody>
-                  <a:tcPr/>
-                </a:tc>
-                <a:extLst>
-                  <a:ext uri="{0D108BD9-81ED-4DB2-BD59-A6C34878D82A}">
-                    <a16:rowId xmlns:a16="http://schemas.microsoft.com/office/drawing/2014/main" val="3136741411"/>
-                  </a:ext>
-                </a:extLst>
-              </a:tr>
-            </a:tbl>
-          </a:graphicData>
-        </a:graphic>
-      </p:graphicFrame>
+            <a:r>
+              <a:rPr lang="en-US" dirty="0"/>
+              <a:t>Hierarchical</a:t>
+            </a:r>
+          </a:p>
+        </p:txBody>
+      </p:sp>
+      <p:pic>
+        <p:nvPicPr>
+          <p:cNvPr id="10" name="Content Placeholder 9" descr="Chart, line chart&#10;&#10;Description automatically generated">
+            <a:extLst>
+              <a:ext uri="{FF2B5EF4-FFF2-40B4-BE49-F238E27FC236}">
+                <a16:creationId xmlns:a16="http://schemas.microsoft.com/office/drawing/2014/main" id="{3CA9D289-EEB8-4114-ACCF-2AF2F39CBB19}"/>
+              </a:ext>
+            </a:extLst>
+          </p:cNvPr>
+          <p:cNvPicPr>
+            <a:picLocks noGrp="1" noChangeAspect="1"/>
+          </p:cNvPicPr>
+          <p:nvPr>
+            <p:ph sz="half" idx="2"/>
+          </p:nvPr>
+        </p:nvPicPr>
+        <p:blipFill>
+          <a:blip r:embed="rId2">
+            <a:extLst>
+              <a:ext uri="{28A0092B-C50C-407E-A947-70E740481C1C}">
+                <a14:useLocalDpi xmlns:a14="http://schemas.microsoft.com/office/drawing/2010/main" val="0"/>
+              </a:ext>
+            </a:extLst>
+          </a:blip>
+          <a:stretch>
+            <a:fillRect/>
+          </a:stretch>
+        </p:blipFill>
+        <p:spPr>
+          <a:xfrm>
+            <a:off x="1273821" y="2505075"/>
+            <a:ext cx="4289720" cy="3684588"/>
+          </a:xfrm>
+        </p:spPr>
+      </p:pic>
+      <p:sp>
+        <p:nvSpPr>
+          <p:cNvPr id="5" name="Text Placeholder 4">
+            <a:extLst>
+              <a:ext uri="{FF2B5EF4-FFF2-40B4-BE49-F238E27FC236}">
+                <a16:creationId xmlns:a16="http://schemas.microsoft.com/office/drawing/2014/main" id="{1374ECB9-C86A-4DEC-BCDE-F34750EA20BC}"/>
+              </a:ext>
+            </a:extLst>
+          </p:cNvPr>
+          <p:cNvSpPr>
+            <a:spLocks noGrp="1"/>
+          </p:cNvSpPr>
+          <p:nvPr>
+            <p:ph type="body" sz="quarter" idx="3"/>
+          </p:nvPr>
+        </p:nvSpPr>
+        <p:spPr/>
+        <p:txBody>
+          <a:bodyPr/>
+          <a:lstStyle/>
+          <a:p>
+            <a:r>
+              <a:rPr lang="en-US" dirty="0"/>
+              <a:t>K-Means</a:t>
+            </a:r>
+          </a:p>
+        </p:txBody>
+      </p:sp>
+      <p:pic>
+        <p:nvPicPr>
+          <p:cNvPr id="8" name="Content Placeholder 7" descr="Chart, line chart&#10;&#10;Description automatically generated">
+            <a:extLst>
+              <a:ext uri="{FF2B5EF4-FFF2-40B4-BE49-F238E27FC236}">
+                <a16:creationId xmlns:a16="http://schemas.microsoft.com/office/drawing/2014/main" id="{685FBE6B-E3E3-4D87-80DF-046B5567ACD5}"/>
+              </a:ext>
+            </a:extLst>
+          </p:cNvPr>
+          <p:cNvPicPr>
+            <a:picLocks noGrp="1" noChangeAspect="1"/>
+          </p:cNvPicPr>
+          <p:nvPr>
+            <p:ph sz="quarter" idx="4"/>
+          </p:nvPr>
+        </p:nvPicPr>
+        <p:blipFill>
+          <a:blip r:embed="rId3">
+            <a:extLst>
+              <a:ext uri="{28A0092B-C50C-407E-A947-70E740481C1C}">
+                <a14:useLocalDpi xmlns:a14="http://schemas.microsoft.com/office/drawing/2010/main" val="0"/>
+              </a:ext>
+            </a:extLst>
+          </a:blip>
+          <a:stretch>
+            <a:fillRect/>
+          </a:stretch>
+        </p:blipFill>
+        <p:spPr>
+          <a:xfrm>
+            <a:off x="6618934" y="2505075"/>
+            <a:ext cx="4289720" cy="3684588"/>
+          </a:xfrm>
+        </p:spPr>
+      </p:pic>
     </p:spTree>
     <p:extLst>
       <p:ext uri="{BB962C8B-B14F-4D97-AF65-F5344CB8AC3E}">
-        <p14:creationId xmlns:p14="http://schemas.microsoft.com/office/powerpoint/2010/main" val="534966571"/>
+        <p14:creationId xmlns:p14="http://schemas.microsoft.com/office/powerpoint/2010/main" val="3334714568"/>
       </p:ext>
     </p:extLst>
   </p:cSld>
@@ -6943,7 +7040,7 @@
           <p:cNvPr id="2" name="Title 1">
             <a:extLst>
               <a:ext uri="{FF2B5EF4-FFF2-40B4-BE49-F238E27FC236}">
-                <a16:creationId xmlns:a16="http://schemas.microsoft.com/office/drawing/2014/main" id="{F8070BCB-05B2-4490-8DB6-B79D92B20FEF}"/>
+                <a16:creationId xmlns:a16="http://schemas.microsoft.com/office/drawing/2014/main" id="{75DB6DE2-9247-4A70-B2FC-C561FB6D6BCC}"/>
               </a:ext>
             </a:extLst>
           </p:cNvPr>
@@ -6956,16 +7053,28 @@
         </p:nvSpPr>
         <p:spPr/>
         <p:txBody>
-          <a:bodyPr>
-            <a:normAutofit/>
-          </a:bodyPr>
+          <a:bodyPr/>
           <a:lstStyle/>
           <a:p>
             <a:pPr algn="ctr"/>
             <a:r>
-              <a:rPr lang="en-US" sz="3000" dirty="0"/>
-              <a:t>Silhouette scores suggest optimal number of clusters of 2</a:t>
-            </a:r>
+              <a:rPr kumimoji="0" lang="en-US" sz="3000" b="0" i="0" u="none" strike="noStrike" kern="1200" cap="none" spc="0" normalizeH="0" baseline="0" noProof="0" dirty="0">
+                <a:ln>
+                  <a:noFill/>
+                </a:ln>
+                <a:solidFill>
+                  <a:prstClr val="black"/>
+                </a:solidFill>
+                <a:effectLst/>
+                <a:uLnTx/>
+                <a:uFillTx/>
+                <a:latin typeface="Calibri Light" panose="020F0302020204030204"/>
+                <a:ea typeface="+mj-ea"/>
+                <a:cs typeface="+mj-cs"/>
+              </a:rPr>
+              <a:t>PCA plot shows clustering based on magnitude of principal component 1</a:t>
+            </a:r>
+            <a:endParaRPr lang="en-US" dirty="0"/>
           </a:p>
         </p:txBody>
       </p:sp>
@@ -6974,7 +7083,7 @@
           <p:cNvPr id="3" name="Text Placeholder 2">
             <a:extLst>
               <a:ext uri="{FF2B5EF4-FFF2-40B4-BE49-F238E27FC236}">
-                <a16:creationId xmlns:a16="http://schemas.microsoft.com/office/drawing/2014/main" id="{F325DF6E-952D-44C9-826B-C83F271C45AA}"/>
+                <a16:creationId xmlns:a16="http://schemas.microsoft.com/office/drawing/2014/main" id="{C3E45124-6680-4948-BA9E-346302BFE622}"/>
               </a:ext>
             </a:extLst>
           </p:cNvPr>
@@ -6999,10 +7108,10 @@
       </p:sp>
       <p:pic>
         <p:nvPicPr>
-          <p:cNvPr id="10" name="Content Placeholder 9" descr="Chart, line chart&#10;&#10;Description automatically generated">
-            <a:extLst>
-              <a:ext uri="{FF2B5EF4-FFF2-40B4-BE49-F238E27FC236}">
-                <a16:creationId xmlns:a16="http://schemas.microsoft.com/office/drawing/2014/main" id="{3CA9D289-EEB8-4114-ACCF-2AF2F39CBB19}"/>
+          <p:cNvPr id="8" name="Content Placeholder 7">
+            <a:extLst>
+              <a:ext uri="{FF2B5EF4-FFF2-40B4-BE49-F238E27FC236}">
+                <a16:creationId xmlns:a16="http://schemas.microsoft.com/office/drawing/2014/main" id="{89A77204-65E8-4288-8684-FC6934B4AB8D}"/>
               </a:ext>
             </a:extLst>
           </p:cNvPr>
@@ -7021,14 +7130,13 @@
               </a:ext>
             </a:extLst>
           </a:blip>
-          <a:stretch>
-            <a:fillRect/>
-          </a:stretch>
+          <a:srcRect/>
+          <a:stretch/>
         </p:blipFill>
         <p:spPr>
           <a:xfrm>
             <a:off x="1273821" y="2505075"/>
-            <a:ext cx="4289720" cy="3684588"/>
+            <a:ext cx="4289720" cy="3684587"/>
           </a:xfrm>
         </p:spPr>
       </p:pic>
@@ -7037,7 +7145,7 @@
           <p:cNvPr id="5" name="Text Placeholder 4">
             <a:extLst>
               <a:ext uri="{FF2B5EF4-FFF2-40B4-BE49-F238E27FC236}">
-                <a16:creationId xmlns:a16="http://schemas.microsoft.com/office/drawing/2014/main" id="{1374ECB9-C86A-4DEC-BCDE-F34750EA20BC}"/>
+                <a16:creationId xmlns:a16="http://schemas.microsoft.com/office/drawing/2014/main" id="{175D2D8D-3A04-4679-B50C-2A4A887C53BE}"/>
               </a:ext>
             </a:extLst>
           </p:cNvPr>
@@ -7062,10 +7170,10 @@
       </p:sp>
       <p:pic>
         <p:nvPicPr>
-          <p:cNvPr id="8" name="Content Placeholder 7" descr="Chart, line chart&#10;&#10;Description automatically generated">
-            <a:extLst>
-              <a:ext uri="{FF2B5EF4-FFF2-40B4-BE49-F238E27FC236}">
-                <a16:creationId xmlns:a16="http://schemas.microsoft.com/office/drawing/2014/main" id="{685FBE6B-E3E3-4D87-80DF-046B5567ACD5}"/>
+          <p:cNvPr id="10" name="Content Placeholder 9">
+            <a:extLst>
+              <a:ext uri="{FF2B5EF4-FFF2-40B4-BE49-F238E27FC236}">
+                <a16:creationId xmlns:a16="http://schemas.microsoft.com/office/drawing/2014/main" id="{A4F407D3-0597-4088-8388-E07A44B843EA}"/>
               </a:ext>
             </a:extLst>
           </p:cNvPr>
@@ -7084,21 +7192,20 @@
               </a:ext>
             </a:extLst>
           </a:blip>
-          <a:stretch>
-            <a:fillRect/>
-          </a:stretch>
+          <a:srcRect/>
+          <a:stretch/>
         </p:blipFill>
         <p:spPr>
           <a:xfrm>
             <a:off x="6618934" y="2505075"/>
-            <a:ext cx="4289720" cy="3684588"/>
+            <a:ext cx="4289719" cy="3684587"/>
           </a:xfrm>
         </p:spPr>
       </p:pic>
     </p:spTree>
     <p:extLst>
       <p:ext uri="{BB962C8B-B14F-4D97-AF65-F5344CB8AC3E}">
-        <p14:creationId xmlns:p14="http://schemas.microsoft.com/office/powerpoint/2010/main" val="3334714568"/>
+        <p14:creationId xmlns:p14="http://schemas.microsoft.com/office/powerpoint/2010/main" val="177966446"/>
       </p:ext>
     </p:extLst>
   </p:cSld>
@@ -7130,7 +7237,7 @@
           <p:cNvPr id="2" name="Title 1">
             <a:extLst>
               <a:ext uri="{FF2B5EF4-FFF2-40B4-BE49-F238E27FC236}">
-                <a16:creationId xmlns:a16="http://schemas.microsoft.com/office/drawing/2014/main" id="{75DB6DE2-9247-4A70-B2FC-C561FB6D6BCC}"/>
+                <a16:creationId xmlns:a16="http://schemas.microsoft.com/office/drawing/2014/main" id="{722C944A-78EF-4A2E-B269-130CF050F8E9}"/>
               </a:ext>
             </a:extLst>
           </p:cNvPr>
@@ -7162,7 +7269,7 @@
                 <a:ea typeface="+mj-ea"/>
                 <a:cs typeface="+mj-cs"/>
               </a:rPr>
-              <a:t>PCA plot shows clustering based on magnitude principal component 1</a:t>
+              <a:t>Clustering differs from grouping by injury mechanism</a:t>
             </a:r>
             <a:endParaRPr lang="en-US" dirty="0"/>
           </a:p>
@@ -7173,7 +7280,7 @@
           <p:cNvPr id="3" name="Text Placeholder 2">
             <a:extLst>
               <a:ext uri="{FF2B5EF4-FFF2-40B4-BE49-F238E27FC236}">
-                <a16:creationId xmlns:a16="http://schemas.microsoft.com/office/drawing/2014/main" id="{C3E45124-6680-4948-BA9E-346302BFE622}"/>
+                <a16:creationId xmlns:a16="http://schemas.microsoft.com/office/drawing/2014/main" id="{2044FC96-64AF-4F8B-ACDB-E5D215A1F918}"/>
               </a:ext>
             </a:extLst>
           </p:cNvPr>
@@ -7201,7 +7308,7 @@
           <p:cNvPr id="8" name="Content Placeholder 7">
             <a:extLst>
               <a:ext uri="{FF2B5EF4-FFF2-40B4-BE49-F238E27FC236}">
-                <a16:creationId xmlns:a16="http://schemas.microsoft.com/office/drawing/2014/main" id="{89A77204-65E8-4288-8684-FC6934B4AB8D}"/>
+                <a16:creationId xmlns:a16="http://schemas.microsoft.com/office/drawing/2014/main" id="{27130AFD-4B1C-418C-91B1-B1CB7AACFEF3}"/>
               </a:ext>
             </a:extLst>
           </p:cNvPr>
@@ -7235,7 +7342,7 @@
           <p:cNvPr id="5" name="Text Placeholder 4">
             <a:extLst>
               <a:ext uri="{FF2B5EF4-FFF2-40B4-BE49-F238E27FC236}">
-                <a16:creationId xmlns:a16="http://schemas.microsoft.com/office/drawing/2014/main" id="{175D2D8D-3A04-4679-B50C-2A4A887C53BE}"/>
+                <a16:creationId xmlns:a16="http://schemas.microsoft.com/office/drawing/2014/main" id="{4CF7FAF9-E194-45DD-909D-6F609A5BD2FA}"/>
               </a:ext>
             </a:extLst>
           </p:cNvPr>
@@ -7253,17 +7360,17 @@
           <a:p>
             <a:r>
               <a:rPr lang="en-US" dirty="0"/>
-              <a:t>K-Means</a:t>
+              <a:t>Injury Mechanism</a:t>
             </a:r>
           </a:p>
         </p:txBody>
       </p:sp>
       <p:pic>
         <p:nvPicPr>
-          <p:cNvPr id="10" name="Content Placeholder 9">
-            <a:extLst>
-              <a:ext uri="{FF2B5EF4-FFF2-40B4-BE49-F238E27FC236}">
-                <a16:creationId xmlns:a16="http://schemas.microsoft.com/office/drawing/2014/main" id="{A4F407D3-0597-4088-8388-E07A44B843EA}"/>
+          <p:cNvPr id="10" name="Content Placeholder 9" descr="Chart, scatter chart&#10;&#10;Description automatically generated">
+            <a:extLst>
+              <a:ext uri="{FF2B5EF4-FFF2-40B4-BE49-F238E27FC236}">
+                <a16:creationId xmlns:a16="http://schemas.microsoft.com/office/drawing/2014/main" id="{F6B286B5-AE7B-4A76-AA83-CA4020325BC3}"/>
               </a:ext>
             </a:extLst>
           </p:cNvPr>
@@ -7282,20 +7389,21 @@
               </a:ext>
             </a:extLst>
           </a:blip>
-          <a:srcRect/>
-          <a:stretch/>
+          <a:stretch>
+            <a:fillRect/>
+          </a:stretch>
         </p:blipFill>
         <p:spPr>
           <a:xfrm>
             <a:off x="6618934" y="2505075"/>
-            <a:ext cx="4289719" cy="3684587"/>
+            <a:ext cx="4289720" cy="3684588"/>
           </a:xfrm>
         </p:spPr>
       </p:pic>
     </p:spTree>
     <p:extLst>
       <p:ext uri="{BB962C8B-B14F-4D97-AF65-F5344CB8AC3E}">
-        <p14:creationId xmlns:p14="http://schemas.microsoft.com/office/powerpoint/2010/main" val="177966446"/>
+        <p14:creationId xmlns:p14="http://schemas.microsoft.com/office/powerpoint/2010/main" val="2261589956"/>
       </p:ext>
     </p:extLst>
   </p:cSld>

</xml_diff>